<commit_message>
Last commit, parce que j'en ai marre et que j'ai envie de dormir
</commit_message>
<xml_diff>
--- a/Hackathon_presentation.pptx
+++ b/Hackathon_presentation.pptx
@@ -107,6 +107,11 @@
       </a:defRPr>
     </a:lvl9pPr>
   </p:defaultTextStyle>
+  <p:extLst>
+    <p:ext uri="{EFAFB233-063F-42B5-8137-9DF3F51BA10A}">
+      <p15:sldGuideLst xmlns:p15="http://schemas.microsoft.com/office/powerpoint/2012/main"/>
+    </p:ext>
+  </p:extLst>
 </p:presentation>
 </file>
 
@@ -2417,12 +2422,12 @@
       <p:bgPr>
         <a:blipFill dpi="0" rotWithShape="1">
           <a:blip r:embed="rId13">
-            <a:alphaModFix amt="61000"/>
+            <a:alphaModFix amt="25000"/>
             <a:lum/>
           </a:blip>
           <a:srcRect/>
           <a:stretch>
-            <a:fillRect t="-9000" b="-9000"/>
+            <a:fillRect t="-12000" b="-12000"/>
           </a:stretch>
         </a:blipFill>
         <a:effectLst/>
@@ -3079,9 +3084,44 @@
           </a:p>
         </p:txBody>
       </p:sp>
+      <p:sp>
+        <p:nvSpPr>
+          <p:cNvPr id="12" name="ZoneTexte 11"/>
+          <p:cNvSpPr txBox="1"/>
+          <p:nvPr/>
+        </p:nvSpPr>
+        <p:spPr>
+          <a:xfrm>
+            <a:off x="-988977" y="6310103"/>
+            <a:ext cx="6661113" cy="369332"/>
+          </a:xfrm>
+          <a:prstGeom prst="rect">
+            <a:avLst/>
+          </a:prstGeom>
+          <a:noFill/>
+        </p:spPr>
+        <p:txBody>
+          <a:bodyPr wrap="square" rtlCol="0">
+            <a:spAutoFit/>
+          </a:bodyPr>
+          <a:lstStyle/>
+          <a:p>
+            <a:pPr algn="ctr"/>
+            <a:r>
+              <a:rPr lang="fr-FR" dirty="0" smtClean="0"/>
+              <a:t>Made </a:t>
+            </a:r>
+            <a:r>
+              <a:rPr lang="fr-FR" smtClean="0"/>
+              <a:t>by Nathalie, Foucauld, Quentin &amp; Julien </a:t>
+            </a:r>
+            <a:endParaRPr lang="fr-FR" dirty="0"/>
+          </a:p>
+        </p:txBody>
+      </p:sp>
       <p:pic>
         <p:nvPicPr>
-          <p:cNvPr id="9" name="Image 8"/>
+          <p:cNvPr id="2" name="Image 1"/>
           <p:cNvPicPr>
             <a:picLocks noChangeAspect="1"/>
           </p:cNvPicPr>
@@ -3101,49 +3141,14 @@
         </p:blipFill>
         <p:spPr>
           <a:xfrm>
-            <a:off x="0" y="0"/>
-            <a:ext cx="12192000" cy="1514439"/>
+            <a:off x="-1" y="-1"/>
+            <a:ext cx="12193249" cy="1765005"/>
           </a:xfrm>
           <a:prstGeom prst="rect">
             <a:avLst/>
           </a:prstGeom>
         </p:spPr>
       </p:pic>
-      <p:sp>
-        <p:nvSpPr>
-          <p:cNvPr id="12" name="ZoneTexte 11"/>
-          <p:cNvSpPr txBox="1"/>
-          <p:nvPr/>
-        </p:nvSpPr>
-        <p:spPr>
-          <a:xfrm>
-            <a:off x="-988977" y="6310103"/>
-            <a:ext cx="6661113" cy="369332"/>
-          </a:xfrm>
-          <a:prstGeom prst="rect">
-            <a:avLst/>
-          </a:prstGeom>
-          <a:noFill/>
-        </p:spPr>
-        <p:txBody>
-          <a:bodyPr wrap="square" rtlCol="0">
-            <a:spAutoFit/>
-          </a:bodyPr>
-          <a:lstStyle/>
-          <a:p>
-            <a:pPr algn="ctr"/>
-            <a:r>
-              <a:rPr lang="fr-FR" dirty="0" smtClean="0"/>
-              <a:t>Made </a:t>
-            </a:r>
-            <a:r>
-              <a:rPr lang="fr-FR" smtClean="0"/>
-              <a:t>by Nathalie, Foucauld, Quentin &amp; Julien </a:t>
-            </a:r>
-            <a:endParaRPr lang="fr-FR" dirty="0"/>
-          </a:p>
-        </p:txBody>
-      </p:sp>
     </p:spTree>
     <p:extLst>
       <p:ext uri="{BB962C8B-B14F-4D97-AF65-F5344CB8AC3E}">
@@ -3160,21 +3165,6 @@
 <file path=ppt/slides/slide2.xml><?xml version="1.0" encoding="utf-8"?>
 <p:sld xmlns:a="http://schemas.openxmlformats.org/drawingml/2006/main" xmlns:r="http://schemas.openxmlformats.org/officeDocument/2006/relationships" xmlns:p="http://schemas.openxmlformats.org/presentationml/2006/main">
   <p:cSld>
-    <p:bg>
-      <p:bgPr>
-        <a:blipFill dpi="0" rotWithShape="1">
-          <a:blip r:embed="rId2">
-            <a:alphaModFix amt="26000"/>
-            <a:lum/>
-          </a:blip>
-          <a:srcRect/>
-          <a:stretch>
-            <a:fillRect t="-9000" b="-9000"/>
-          </a:stretch>
-        </a:blipFill>
-        <a:effectLst/>
-      </p:bgPr>
-    </p:bg>
     <p:spTree>
       <p:nvGrpSpPr>
         <p:cNvPr id="1" name=""/>
@@ -3198,6 +3188,153 @@
           <p:nvPr/>
         </p:nvPicPr>
         <p:blipFill>
+          <a:blip r:embed="rId2">
+            <a:extLst>
+              <a:ext uri="{28A0092B-C50C-407E-A947-70E740481C1C}">
+                <a14:useLocalDpi xmlns:a14="http://schemas.microsoft.com/office/drawing/2010/main" val="0"/>
+              </a:ext>
+            </a:extLst>
+          </a:blip>
+          <a:stretch>
+            <a:fillRect/>
+          </a:stretch>
+        </p:blipFill>
+        <p:spPr>
+          <a:xfrm>
+            <a:off x="10343116" y="4911501"/>
+            <a:ext cx="1607879" cy="1774654"/>
+          </a:xfrm>
+          <a:prstGeom prst="rect">
+            <a:avLst/>
+          </a:prstGeom>
+          <a:effectLst>
+            <a:softEdge rad="114300"/>
+          </a:effectLst>
+        </p:spPr>
+      </p:pic>
+      <p:sp>
+        <p:nvSpPr>
+          <p:cNvPr id="7" name="ZoneTexte 6"/>
+          <p:cNvSpPr txBox="1"/>
+          <p:nvPr/>
+        </p:nvSpPr>
+        <p:spPr>
+          <a:xfrm>
+            <a:off x="9088474" y="6125437"/>
+            <a:ext cx="1254642" cy="369332"/>
+          </a:xfrm>
+          <a:prstGeom prst="rect">
+            <a:avLst/>
+          </a:prstGeom>
+          <a:noFill/>
+        </p:spPr>
+        <p:txBody>
+          <a:bodyPr wrap="square" rtlCol="0">
+            <a:spAutoFit/>
+          </a:bodyPr>
+          <a:lstStyle/>
+          <a:p>
+            <a:pPr algn="ctr"/>
+            <a:r>
+              <a:rPr lang="fr-FR" dirty="0" smtClean="0"/>
+              <a:t>Avril 2019</a:t>
+            </a:r>
+            <a:endParaRPr lang="fr-FR" dirty="0"/>
+          </a:p>
+        </p:txBody>
+      </p:sp>
+      <p:sp>
+        <p:nvSpPr>
+          <p:cNvPr id="13" name="ZoneTexte 12"/>
+          <p:cNvSpPr txBox="1"/>
+          <p:nvPr/>
+        </p:nvSpPr>
+        <p:spPr>
+          <a:xfrm>
+            <a:off x="-988977" y="6310103"/>
+            <a:ext cx="6661113" cy="369332"/>
+          </a:xfrm>
+          <a:prstGeom prst="rect">
+            <a:avLst/>
+          </a:prstGeom>
+          <a:noFill/>
+        </p:spPr>
+        <p:txBody>
+          <a:bodyPr wrap="square" rtlCol="0">
+            <a:spAutoFit/>
+          </a:bodyPr>
+          <a:lstStyle/>
+          <a:p>
+            <a:pPr algn="ctr"/>
+            <a:r>
+              <a:rPr lang="fr-FR" dirty="0" smtClean="0"/>
+              <a:t>Made </a:t>
+            </a:r>
+            <a:r>
+              <a:rPr lang="fr-FR" smtClean="0"/>
+              <a:t>by Nathalie, Foucauld, Quentin &amp; Julien </a:t>
+            </a:r>
+            <a:endParaRPr lang="fr-FR" dirty="0"/>
+          </a:p>
+        </p:txBody>
+      </p:sp>
+      <p:sp>
+        <p:nvSpPr>
+          <p:cNvPr id="14" name="ZoneTexte 13"/>
+          <p:cNvSpPr txBox="1"/>
+          <p:nvPr/>
+        </p:nvSpPr>
+        <p:spPr>
+          <a:xfrm>
+            <a:off x="1928810" y="1827974"/>
+            <a:ext cx="7915277" cy="2677656"/>
+          </a:xfrm>
+          <a:prstGeom prst="rect">
+            <a:avLst/>
+          </a:prstGeom>
+          <a:noFill/>
+        </p:spPr>
+        <p:txBody>
+          <a:bodyPr wrap="square" rtlCol="0">
+            <a:spAutoFit/>
+          </a:bodyPr>
+          <a:lstStyle/>
+          <a:p>
+            <a:r>
+              <a:rPr lang="fr-FR" sz="2400" b="1" dirty="0" smtClean="0"/>
+              <a:t>Mais c’est quoi ce jeu ?</a:t>
+            </a:r>
+          </a:p>
+          <a:p>
+            <a:endParaRPr lang="fr-FR" sz="2400" dirty="0"/>
+          </a:p>
+          <a:p>
+            <a:r>
+              <a:rPr lang="fr-FR" sz="2400" dirty="0" smtClean="0"/>
+              <a:t>Célèbre jeu de mémoire,                                        consiste à composer des paires de cartes en les retournant deux par deux.</a:t>
+            </a:r>
+          </a:p>
+          <a:p>
+            <a:endParaRPr lang="fr-FR" sz="2400" dirty="0" smtClean="0"/>
+          </a:p>
+          <a:p>
+            <a:r>
+              <a:rPr lang="fr-FR" sz="2400" dirty="0" smtClean="0"/>
+              <a:t>Le but est de tout découvrir le plus rapidement possible </a:t>
+            </a:r>
+            <a:endParaRPr lang="fr-FR" sz="2400" dirty="0"/>
+          </a:p>
+        </p:txBody>
+      </p:sp>
+      <p:pic>
+        <p:nvPicPr>
+          <p:cNvPr id="8" name="Image 7"/>
+          <p:cNvPicPr>
+            <a:picLocks noChangeAspect="1"/>
+          </p:cNvPicPr>
+          <p:nvPr/>
+        </p:nvPicPr>
+        <p:blipFill>
           <a:blip r:embed="rId3">
             <a:extLst>
               <a:ext uri="{28A0092B-C50C-407E-A947-70E740481C1C}">
@@ -3211,58 +3348,24 @@
         </p:blipFill>
         <p:spPr>
           <a:xfrm>
-            <a:off x="10343116" y="4911501"/>
-            <a:ext cx="1607879" cy="1774654"/>
+            <a:off x="-1" y="-1"/>
+            <a:ext cx="12193249" cy="1765005"/>
           </a:xfrm>
           <a:prstGeom prst="rect">
             <a:avLst/>
           </a:prstGeom>
-          <a:effectLst>
-            <a:softEdge rad="114300"/>
-          </a:effectLst>
         </p:spPr>
       </p:pic>
-      <p:sp>
-        <p:nvSpPr>
-          <p:cNvPr id="7" name="ZoneTexte 6"/>
-          <p:cNvSpPr txBox="1"/>
-          <p:nvPr/>
-        </p:nvSpPr>
-        <p:spPr>
-          <a:xfrm>
-            <a:off x="9088474" y="6125437"/>
-            <a:ext cx="1254642" cy="369332"/>
-          </a:xfrm>
-          <a:prstGeom prst="rect">
-            <a:avLst/>
-          </a:prstGeom>
-          <a:noFill/>
-        </p:spPr>
-        <p:txBody>
-          <a:bodyPr wrap="square" rtlCol="0">
-            <a:spAutoFit/>
-          </a:bodyPr>
-          <a:lstStyle/>
-          <a:p>
-            <a:pPr algn="ctr"/>
-            <a:r>
-              <a:rPr lang="fr-FR" dirty="0" smtClean="0"/>
-              <a:t>Avril 2019</a:t>
-            </a:r>
-            <a:endParaRPr lang="fr-FR" dirty="0"/>
-          </a:p>
-        </p:txBody>
-      </p:sp>
       <p:pic>
         <p:nvPicPr>
-          <p:cNvPr id="11" name="Image 10"/>
+          <p:cNvPr id="9" name="Image 8"/>
           <p:cNvPicPr>
             <a:picLocks noChangeAspect="1"/>
           </p:cNvPicPr>
           <p:nvPr/>
         </p:nvPicPr>
         <p:blipFill>
-          <a:blip r:embed="rId4">
+          <a:blip r:embed="rId3">
             <a:extLst>
               <a:ext uri="{28A0092B-C50C-407E-A947-70E740481C1C}">
                 <a14:useLocalDpi xmlns:a14="http://schemas.microsoft.com/office/drawing/2010/main" val="0"/>
@@ -3275,121 +3378,8 @@
         </p:blipFill>
         <p:spPr>
           <a:xfrm>
-            <a:off x="0" y="-1"/>
-            <a:ext cx="12192000" cy="1514439"/>
-          </a:xfrm>
-          <a:prstGeom prst="rect">
-            <a:avLst/>
-          </a:prstGeom>
-        </p:spPr>
-      </p:pic>
-      <p:sp>
-        <p:nvSpPr>
-          <p:cNvPr id="13" name="ZoneTexte 12"/>
-          <p:cNvSpPr txBox="1"/>
-          <p:nvPr/>
-        </p:nvSpPr>
-        <p:spPr>
-          <a:xfrm>
-            <a:off x="-988977" y="6310103"/>
-            <a:ext cx="6661113" cy="369332"/>
-          </a:xfrm>
-          <a:prstGeom prst="rect">
-            <a:avLst/>
-          </a:prstGeom>
-          <a:noFill/>
-        </p:spPr>
-        <p:txBody>
-          <a:bodyPr wrap="square" rtlCol="0">
-            <a:spAutoFit/>
-          </a:bodyPr>
-          <a:lstStyle/>
-          <a:p>
-            <a:pPr algn="ctr"/>
-            <a:r>
-              <a:rPr lang="fr-FR" dirty="0" smtClean="0"/>
-              <a:t>Made </a:t>
-            </a:r>
-            <a:r>
-              <a:rPr lang="fr-FR" smtClean="0"/>
-              <a:t>by Nathalie, Foucauld, Quentin &amp; Julien </a:t>
-            </a:r>
-            <a:endParaRPr lang="fr-FR" dirty="0"/>
-          </a:p>
-        </p:txBody>
-      </p:sp>
-      <p:sp>
-        <p:nvSpPr>
-          <p:cNvPr id="14" name="ZoneTexte 13"/>
-          <p:cNvSpPr txBox="1"/>
-          <p:nvPr/>
-        </p:nvSpPr>
-        <p:spPr>
-          <a:xfrm>
-            <a:off x="1928810" y="1827974"/>
-            <a:ext cx="7915277" cy="2677656"/>
-          </a:xfrm>
-          <a:prstGeom prst="rect">
-            <a:avLst/>
-          </a:prstGeom>
-          <a:noFill/>
-        </p:spPr>
-        <p:txBody>
-          <a:bodyPr wrap="square" rtlCol="0">
-            <a:spAutoFit/>
-          </a:bodyPr>
-          <a:lstStyle/>
-          <a:p>
-            <a:r>
-              <a:rPr lang="fr-FR" sz="2400" b="1" dirty="0" smtClean="0"/>
-              <a:t>Mais c’est quoi ce jeu ?</a:t>
-            </a:r>
-          </a:p>
-          <a:p>
-            <a:endParaRPr lang="fr-FR" sz="2400" dirty="0"/>
-          </a:p>
-          <a:p>
-            <a:r>
-              <a:rPr lang="fr-FR" sz="2400" dirty="0" smtClean="0"/>
-              <a:t>Célèbre jeu de mémoire,                                        consiste à composer des paires de cartes en les retournant deux par deux.</a:t>
-            </a:r>
-          </a:p>
-          <a:p>
-            <a:endParaRPr lang="fr-FR" sz="2400" dirty="0" smtClean="0"/>
-          </a:p>
-          <a:p>
-            <a:r>
-              <a:rPr lang="fr-FR" sz="2400" dirty="0" smtClean="0"/>
-              <a:t>Le but est de tout découvrir le plus rapidement possible </a:t>
-            </a:r>
-            <a:endParaRPr lang="fr-FR" sz="2400" dirty="0"/>
-          </a:p>
-        </p:txBody>
-      </p:sp>
-      <p:pic>
-        <p:nvPicPr>
-          <p:cNvPr id="15" name="Image 14"/>
-          <p:cNvPicPr>
-            <a:picLocks noChangeAspect="1"/>
-          </p:cNvPicPr>
-          <p:nvPr/>
-        </p:nvPicPr>
-        <p:blipFill>
-          <a:blip r:embed="rId4">
-            <a:extLst>
-              <a:ext uri="{28A0092B-C50C-407E-A947-70E740481C1C}">
-                <a14:useLocalDpi xmlns:a14="http://schemas.microsoft.com/office/drawing/2010/main" val="0"/>
-              </a:ext>
-            </a:extLst>
-          </a:blip>
-          <a:stretch>
-            <a:fillRect/>
-          </a:stretch>
-        </p:blipFill>
-        <p:spPr>
-          <a:xfrm>
-            <a:off x="5188679" y="2600326"/>
-            <a:ext cx="2530490" cy="314326"/>
+            <a:off x="5124893" y="2637279"/>
+            <a:ext cx="2573080" cy="372460"/>
           </a:xfrm>
           <a:prstGeom prst="rect">
             <a:avLst/>
@@ -3412,21 +3402,6 @@
 <file path=ppt/slides/slide3.xml><?xml version="1.0" encoding="utf-8"?>
 <p:sld xmlns:a="http://schemas.openxmlformats.org/drawingml/2006/main" xmlns:r="http://schemas.openxmlformats.org/officeDocument/2006/relationships" xmlns:p="http://schemas.openxmlformats.org/presentationml/2006/main">
   <p:cSld>
-    <p:bg>
-      <p:bgPr>
-        <a:blipFill dpi="0" rotWithShape="1">
-          <a:blip r:embed="rId2">
-            <a:alphaModFix amt="24000"/>
-            <a:lum/>
-          </a:blip>
-          <a:srcRect/>
-          <a:stretch>
-            <a:fillRect t="-9000" b="-9000"/>
-          </a:stretch>
-        </a:blipFill>
-        <a:effectLst/>
-      </p:bgPr>
-    </p:bg>
     <p:spTree>
       <p:nvGrpSpPr>
         <p:cNvPr id="1" name=""/>
@@ -3450,7 +3425,7 @@
           <p:nvPr/>
         </p:nvPicPr>
         <p:blipFill>
-          <a:blip r:embed="rId3">
+          <a:blip r:embed="rId2">
             <a:extLst>
               <a:ext uri="{28A0092B-C50C-407E-A947-70E740481C1C}">
                 <a14:useLocalDpi xmlns:a14="http://schemas.microsoft.com/office/drawing/2010/main" val="0"/>
@@ -3505,9 +3480,108 @@
           </a:p>
         </p:txBody>
       </p:sp>
+      <p:sp>
+        <p:nvSpPr>
+          <p:cNvPr id="13" name="ZoneTexte 12"/>
+          <p:cNvSpPr txBox="1"/>
+          <p:nvPr/>
+        </p:nvSpPr>
+        <p:spPr>
+          <a:xfrm>
+            <a:off x="-988977" y="6310103"/>
+            <a:ext cx="6661113" cy="369332"/>
+          </a:xfrm>
+          <a:prstGeom prst="rect">
+            <a:avLst/>
+          </a:prstGeom>
+          <a:noFill/>
+        </p:spPr>
+        <p:txBody>
+          <a:bodyPr wrap="square" rtlCol="0">
+            <a:spAutoFit/>
+          </a:bodyPr>
+          <a:lstStyle/>
+          <a:p>
+            <a:pPr algn="ctr"/>
+            <a:r>
+              <a:rPr lang="fr-FR" dirty="0" smtClean="0"/>
+              <a:t>Made </a:t>
+            </a:r>
+            <a:r>
+              <a:rPr lang="fr-FR" smtClean="0"/>
+              <a:t>by Nathalie, Foucauld, Quentin &amp; Julien </a:t>
+            </a:r>
+            <a:endParaRPr lang="fr-FR" dirty="0"/>
+          </a:p>
+        </p:txBody>
+      </p:sp>
+      <p:sp>
+        <p:nvSpPr>
+          <p:cNvPr id="14" name="ZoneTexte 13"/>
+          <p:cNvSpPr txBox="1"/>
+          <p:nvPr/>
+        </p:nvSpPr>
+        <p:spPr>
+          <a:xfrm>
+            <a:off x="1928810" y="1827974"/>
+            <a:ext cx="7915277" cy="2677656"/>
+          </a:xfrm>
+          <a:prstGeom prst="rect">
+            <a:avLst/>
+          </a:prstGeom>
+          <a:noFill/>
+        </p:spPr>
+        <p:txBody>
+          <a:bodyPr wrap="square" rtlCol="0">
+            <a:spAutoFit/>
+          </a:bodyPr>
+          <a:lstStyle/>
+          <a:p>
+            <a:r>
+              <a:rPr lang="fr-FR" sz="2400" b="1" dirty="0" smtClean="0"/>
+              <a:t>A quoi ça ressemble ?</a:t>
+            </a:r>
+          </a:p>
+          <a:p>
+            <a:endParaRPr lang="fr-FR" sz="2400" dirty="0"/>
+          </a:p>
+          <a:p>
+            <a:pPr algn="just"/>
+            <a:r>
+              <a:rPr lang="fr-FR" sz="2400" dirty="0" smtClean="0"/>
+              <a:t>Quand Pâques rencontre une équipe de </a:t>
+            </a:r>
+            <a:r>
+              <a:rPr lang="fr-FR" sz="2400" dirty="0" smtClean="0"/>
+              <a:t>développeurs </a:t>
+            </a:r>
+            <a:r>
+              <a:rPr lang="fr-FR" sz="2400" dirty="0" smtClean="0"/>
+              <a:t>de talent , ça donne                                          :</a:t>
+            </a:r>
+          </a:p>
+          <a:p>
+            <a:pPr algn="just"/>
+            <a:endParaRPr lang="fr-FR" sz="2400" dirty="0"/>
+          </a:p>
+          <a:p>
+            <a:pPr algn="just"/>
+            <a:r>
+              <a:rPr lang="fr-FR" sz="2400" dirty="0" smtClean="0">
+                <a:hlinkClick r:id="rId3"/>
+              </a:rPr>
+              <a:t>http://localhost:8000/Home/index</a:t>
+            </a:r>
+            <a:endParaRPr lang="fr-FR" sz="2400" dirty="0" smtClean="0"/>
+          </a:p>
+          <a:p>
+            <a:endParaRPr lang="fr-FR" sz="2400" dirty="0"/>
+          </a:p>
+        </p:txBody>
+      </p:sp>
       <p:pic>
         <p:nvPicPr>
-          <p:cNvPr id="11" name="Image 10"/>
+          <p:cNvPr id="8" name="Image 7"/>
           <p:cNvPicPr>
             <a:picLocks noChangeAspect="1"/>
           </p:cNvPicPr>
@@ -3527,108 +3601,17 @@
         </p:blipFill>
         <p:spPr>
           <a:xfrm>
-            <a:off x="0" y="-1"/>
-            <a:ext cx="12192000" cy="1514439"/>
+            <a:off x="-1" y="-1"/>
+            <a:ext cx="12193249" cy="1765005"/>
           </a:xfrm>
           <a:prstGeom prst="rect">
             <a:avLst/>
           </a:prstGeom>
         </p:spPr>
       </p:pic>
-      <p:sp>
-        <p:nvSpPr>
-          <p:cNvPr id="13" name="ZoneTexte 12"/>
-          <p:cNvSpPr txBox="1"/>
-          <p:nvPr/>
-        </p:nvSpPr>
-        <p:spPr>
-          <a:xfrm>
-            <a:off x="-988977" y="6310103"/>
-            <a:ext cx="6661113" cy="369332"/>
-          </a:xfrm>
-          <a:prstGeom prst="rect">
-            <a:avLst/>
-          </a:prstGeom>
-          <a:noFill/>
-        </p:spPr>
-        <p:txBody>
-          <a:bodyPr wrap="square" rtlCol="0">
-            <a:spAutoFit/>
-          </a:bodyPr>
-          <a:lstStyle/>
-          <a:p>
-            <a:pPr algn="ctr"/>
-            <a:r>
-              <a:rPr lang="fr-FR" dirty="0" smtClean="0"/>
-              <a:t>Made </a:t>
-            </a:r>
-            <a:r>
-              <a:rPr lang="fr-FR" smtClean="0"/>
-              <a:t>by Nathalie, Foucauld, Quentin &amp; Julien </a:t>
-            </a:r>
-            <a:endParaRPr lang="fr-FR" dirty="0"/>
-          </a:p>
-        </p:txBody>
-      </p:sp>
-      <p:sp>
-        <p:nvSpPr>
-          <p:cNvPr id="14" name="ZoneTexte 13"/>
-          <p:cNvSpPr txBox="1"/>
-          <p:nvPr/>
-        </p:nvSpPr>
-        <p:spPr>
-          <a:xfrm>
-            <a:off x="1928810" y="1827974"/>
-            <a:ext cx="7915277" cy="2677656"/>
-          </a:xfrm>
-          <a:prstGeom prst="rect">
-            <a:avLst/>
-          </a:prstGeom>
-          <a:noFill/>
-        </p:spPr>
-        <p:txBody>
-          <a:bodyPr wrap="square" rtlCol="0">
-            <a:spAutoFit/>
-          </a:bodyPr>
-          <a:lstStyle/>
-          <a:p>
-            <a:r>
-              <a:rPr lang="fr-FR" sz="2400" b="1" dirty="0" smtClean="0"/>
-              <a:t>A quoi ça ressemble ?</a:t>
-            </a:r>
-          </a:p>
-          <a:p>
-            <a:endParaRPr lang="fr-FR" sz="2400" dirty="0"/>
-          </a:p>
-          <a:p>
-            <a:pPr algn="just"/>
-            <a:r>
-              <a:rPr lang="fr-FR" sz="2400" dirty="0" smtClean="0"/>
-              <a:t>Quand Pâques rencontre une équipe de développeur de talent , ça donne                                          :</a:t>
-            </a:r>
-          </a:p>
-          <a:p>
-            <a:pPr algn="just"/>
-            <a:endParaRPr lang="fr-FR" sz="2400" dirty="0"/>
-          </a:p>
-          <a:p>
-            <a:pPr algn="just"/>
-            <a:r>
-              <a:rPr lang="fr-FR" sz="2400" dirty="0" smtClean="0">
-                <a:hlinkClick r:id="rId5"/>
-              </a:rPr>
-              <a:t>http://localhost:8000/Home/index</a:t>
-            </a:r>
-            <a:endParaRPr lang="fr-FR" sz="2400" dirty="0" smtClean="0"/>
-          </a:p>
-          <a:p>
-            <a:endParaRPr lang="fr-FR" sz="2400" dirty="0"/>
-          </a:p>
-        </p:txBody>
-      </p:sp>
       <p:pic>
         <p:nvPicPr>
-          <p:cNvPr id="15" name="Image 14"/>
+          <p:cNvPr id="9" name="Image 8"/>
           <p:cNvPicPr>
             <a:picLocks noChangeAspect="1"/>
           </p:cNvPicPr>
@@ -3648,8 +3631,8 @@
         </p:blipFill>
         <p:spPr>
           <a:xfrm>
-            <a:off x="4258035" y="3024150"/>
-            <a:ext cx="2530490" cy="314326"/>
+            <a:off x="4235302" y="3065812"/>
+            <a:ext cx="2527006" cy="365791"/>
           </a:xfrm>
           <a:prstGeom prst="rect">
             <a:avLst/>
@@ -3672,21 +3655,6 @@
 <file path=ppt/slides/slide4.xml><?xml version="1.0" encoding="utf-8"?>
 <p:sld xmlns:a="http://schemas.openxmlformats.org/drawingml/2006/main" xmlns:r="http://schemas.openxmlformats.org/officeDocument/2006/relationships" xmlns:p="http://schemas.openxmlformats.org/presentationml/2006/main">
   <p:cSld>
-    <p:bg>
-      <p:bgPr>
-        <a:blipFill dpi="0" rotWithShape="1">
-          <a:blip r:embed="rId2">
-            <a:alphaModFix amt="26000"/>
-            <a:lum/>
-          </a:blip>
-          <a:srcRect/>
-          <a:stretch>
-            <a:fillRect t="-9000" b="-9000"/>
-          </a:stretch>
-        </a:blipFill>
-        <a:effectLst/>
-      </p:bgPr>
-    </p:bg>
     <p:spTree>
       <p:nvGrpSpPr>
         <p:cNvPr id="1" name=""/>
@@ -3710,6 +3678,135 @@
           <p:nvPr/>
         </p:nvPicPr>
         <p:blipFill>
+          <a:blip r:embed="rId2">
+            <a:extLst>
+              <a:ext uri="{28A0092B-C50C-407E-A947-70E740481C1C}">
+                <a14:useLocalDpi xmlns:a14="http://schemas.microsoft.com/office/drawing/2010/main" val="0"/>
+              </a:ext>
+            </a:extLst>
+          </a:blip>
+          <a:stretch>
+            <a:fillRect/>
+          </a:stretch>
+        </p:blipFill>
+        <p:spPr>
+          <a:xfrm>
+            <a:off x="10343116" y="4911501"/>
+            <a:ext cx="1607879" cy="1774654"/>
+          </a:xfrm>
+          <a:prstGeom prst="rect">
+            <a:avLst/>
+          </a:prstGeom>
+          <a:effectLst>
+            <a:softEdge rad="114300"/>
+          </a:effectLst>
+        </p:spPr>
+      </p:pic>
+      <p:sp>
+        <p:nvSpPr>
+          <p:cNvPr id="7" name="ZoneTexte 6"/>
+          <p:cNvSpPr txBox="1"/>
+          <p:nvPr/>
+        </p:nvSpPr>
+        <p:spPr>
+          <a:xfrm>
+            <a:off x="9088474" y="6125437"/>
+            <a:ext cx="1254642" cy="369332"/>
+          </a:xfrm>
+          <a:prstGeom prst="rect">
+            <a:avLst/>
+          </a:prstGeom>
+          <a:noFill/>
+        </p:spPr>
+        <p:txBody>
+          <a:bodyPr wrap="square" rtlCol="0">
+            <a:spAutoFit/>
+          </a:bodyPr>
+          <a:lstStyle/>
+          <a:p>
+            <a:pPr algn="ctr"/>
+            <a:r>
+              <a:rPr lang="fr-FR" dirty="0" smtClean="0"/>
+              <a:t>Avril 2019</a:t>
+            </a:r>
+            <a:endParaRPr lang="fr-FR" dirty="0"/>
+          </a:p>
+        </p:txBody>
+      </p:sp>
+      <p:sp>
+        <p:nvSpPr>
+          <p:cNvPr id="13" name="ZoneTexte 12"/>
+          <p:cNvSpPr txBox="1"/>
+          <p:nvPr/>
+        </p:nvSpPr>
+        <p:spPr>
+          <a:xfrm>
+            <a:off x="-988977" y="6310103"/>
+            <a:ext cx="6661113" cy="369332"/>
+          </a:xfrm>
+          <a:prstGeom prst="rect">
+            <a:avLst/>
+          </a:prstGeom>
+          <a:noFill/>
+        </p:spPr>
+        <p:txBody>
+          <a:bodyPr wrap="square" rtlCol="0">
+            <a:spAutoFit/>
+          </a:bodyPr>
+          <a:lstStyle/>
+          <a:p>
+            <a:pPr algn="ctr"/>
+            <a:r>
+              <a:rPr lang="fr-FR" dirty="0" smtClean="0"/>
+              <a:t>Made </a:t>
+            </a:r>
+            <a:r>
+              <a:rPr lang="fr-FR" smtClean="0"/>
+              <a:t>by Nathalie, Foucauld, Quentin &amp; Julien </a:t>
+            </a:r>
+            <a:endParaRPr lang="fr-FR" dirty="0"/>
+          </a:p>
+        </p:txBody>
+      </p:sp>
+      <p:sp>
+        <p:nvSpPr>
+          <p:cNvPr id="14" name="ZoneTexte 13"/>
+          <p:cNvSpPr txBox="1"/>
+          <p:nvPr/>
+        </p:nvSpPr>
+        <p:spPr>
+          <a:xfrm>
+            <a:off x="3734315" y="3404440"/>
+            <a:ext cx="5981480" cy="646331"/>
+          </a:xfrm>
+          <a:prstGeom prst="rect">
+            <a:avLst/>
+          </a:prstGeom>
+          <a:noFill/>
+        </p:spPr>
+        <p:txBody>
+          <a:bodyPr wrap="square" rtlCol="0">
+            <a:spAutoFit/>
+          </a:bodyPr>
+          <a:lstStyle/>
+          <a:p>
+            <a:r>
+              <a:rPr lang="fr-FR" sz="3600" b="1" dirty="0" smtClean="0"/>
+              <a:t>Merci de votre attention</a:t>
+            </a:r>
+            <a:endParaRPr lang="fr-FR" sz="3600" dirty="0"/>
+          </a:p>
+        </p:txBody>
+      </p:sp>
+      <p:pic>
+        <p:nvPicPr>
+          <p:cNvPr id="8" name="Image 7"/>
+          <p:cNvPicPr>
+            <a:picLocks noChangeAspect="1"/>
+          </p:cNvPicPr>
+          <p:nvPr/>
+        </p:nvPicPr>
+        <p:blipFill>
           <a:blip r:embed="rId3">
             <a:extLst>
               <a:ext uri="{28A0092B-C50C-407E-A947-70E740481C1C}">
@@ -3723,143 +3820,14 @@
         </p:blipFill>
         <p:spPr>
           <a:xfrm>
-            <a:off x="10343116" y="4911501"/>
-            <a:ext cx="1607879" cy="1774654"/>
+            <a:off x="-1" y="-1"/>
+            <a:ext cx="12193249" cy="1765005"/>
           </a:xfrm>
           <a:prstGeom prst="rect">
             <a:avLst/>
           </a:prstGeom>
-          <a:effectLst>
-            <a:softEdge rad="114300"/>
-          </a:effectLst>
         </p:spPr>
       </p:pic>
-      <p:sp>
-        <p:nvSpPr>
-          <p:cNvPr id="7" name="ZoneTexte 6"/>
-          <p:cNvSpPr txBox="1"/>
-          <p:nvPr/>
-        </p:nvSpPr>
-        <p:spPr>
-          <a:xfrm>
-            <a:off x="9088474" y="6125437"/>
-            <a:ext cx="1254642" cy="369332"/>
-          </a:xfrm>
-          <a:prstGeom prst="rect">
-            <a:avLst/>
-          </a:prstGeom>
-          <a:noFill/>
-        </p:spPr>
-        <p:txBody>
-          <a:bodyPr wrap="square" rtlCol="0">
-            <a:spAutoFit/>
-          </a:bodyPr>
-          <a:lstStyle/>
-          <a:p>
-            <a:pPr algn="ctr"/>
-            <a:r>
-              <a:rPr lang="fr-FR" dirty="0" smtClean="0"/>
-              <a:t>Avril 2019</a:t>
-            </a:r>
-            <a:endParaRPr lang="fr-FR" dirty="0"/>
-          </a:p>
-        </p:txBody>
-      </p:sp>
-      <p:pic>
-        <p:nvPicPr>
-          <p:cNvPr id="11" name="Image 10"/>
-          <p:cNvPicPr>
-            <a:picLocks noChangeAspect="1"/>
-          </p:cNvPicPr>
-          <p:nvPr/>
-        </p:nvPicPr>
-        <p:blipFill>
-          <a:blip r:embed="rId4">
-            <a:extLst>
-              <a:ext uri="{28A0092B-C50C-407E-A947-70E740481C1C}">
-                <a14:useLocalDpi xmlns:a14="http://schemas.microsoft.com/office/drawing/2010/main" val="0"/>
-              </a:ext>
-            </a:extLst>
-          </a:blip>
-          <a:stretch>
-            <a:fillRect/>
-          </a:stretch>
-        </p:blipFill>
-        <p:spPr>
-          <a:xfrm>
-            <a:off x="0" y="0"/>
-            <a:ext cx="12192000" cy="1514439"/>
-          </a:xfrm>
-          <a:prstGeom prst="rect">
-            <a:avLst/>
-          </a:prstGeom>
-        </p:spPr>
-      </p:pic>
-      <p:sp>
-        <p:nvSpPr>
-          <p:cNvPr id="13" name="ZoneTexte 12"/>
-          <p:cNvSpPr txBox="1"/>
-          <p:nvPr/>
-        </p:nvSpPr>
-        <p:spPr>
-          <a:xfrm>
-            <a:off x="-988977" y="6310103"/>
-            <a:ext cx="6661113" cy="369332"/>
-          </a:xfrm>
-          <a:prstGeom prst="rect">
-            <a:avLst/>
-          </a:prstGeom>
-          <a:noFill/>
-        </p:spPr>
-        <p:txBody>
-          <a:bodyPr wrap="square" rtlCol="0">
-            <a:spAutoFit/>
-          </a:bodyPr>
-          <a:lstStyle/>
-          <a:p>
-            <a:pPr algn="ctr"/>
-            <a:r>
-              <a:rPr lang="fr-FR" dirty="0" smtClean="0"/>
-              <a:t>Made </a:t>
-            </a:r>
-            <a:r>
-              <a:rPr lang="fr-FR" smtClean="0"/>
-              <a:t>by Nathalie, Foucauld, Quentin &amp; Julien </a:t>
-            </a:r>
-            <a:endParaRPr lang="fr-FR" dirty="0"/>
-          </a:p>
-        </p:txBody>
-      </p:sp>
-      <p:sp>
-        <p:nvSpPr>
-          <p:cNvPr id="14" name="ZoneTexte 13"/>
-          <p:cNvSpPr txBox="1"/>
-          <p:nvPr/>
-        </p:nvSpPr>
-        <p:spPr>
-          <a:xfrm>
-            <a:off x="3734315" y="3404440"/>
-            <a:ext cx="5981480" cy="646331"/>
-          </a:xfrm>
-          <a:prstGeom prst="rect">
-            <a:avLst/>
-          </a:prstGeom>
-          <a:noFill/>
-        </p:spPr>
-        <p:txBody>
-          <a:bodyPr wrap="square" rtlCol="0">
-            <a:spAutoFit/>
-          </a:bodyPr>
-          <a:lstStyle/>
-          <a:p>
-            <a:r>
-              <a:rPr lang="fr-FR" sz="3600" b="1" dirty="0" smtClean="0"/>
-              <a:t>Merci de votre attention</a:t>
-            </a:r>
-            <a:endParaRPr lang="fr-FR" sz="3600" dirty="0"/>
-          </a:p>
-        </p:txBody>
-      </p:sp>
     </p:spTree>
     <p:extLst>
       <p:ext uri="{BB962C8B-B14F-4D97-AF65-F5344CB8AC3E}">

</xml_diff>